<commit_message>
deck with example 2
</commit_message>
<xml_diff>
--- a/concept_deck.pptx
+++ b/concept_deck.pptx
@@ -1616,6 +1616,90 @@
           <a:bodyPr/>
           <a:lstStyle/>
           <a:p>
+            <a:endParaRPr lang="es-ES_tradnl" dirty="0"/>
+          </a:p>
+        </p:txBody>
+      </p:sp>
+      <p:sp>
+        <p:nvSpPr>
+          <p:cNvPr id="4" name="Marcador de número de diapositiva 3"/>
+          <p:cNvSpPr>
+            <a:spLocks noGrp="1"/>
+          </p:cNvSpPr>
+          <p:nvPr>
+            <p:ph type="sldNum" sz="quarter" idx="10"/>
+          </p:nvPr>
+        </p:nvSpPr>
+        <p:spPr/>
+        <p:txBody>
+          <a:bodyPr/>
+          <a:lstStyle/>
+          <a:p>
+            <a:fld id="{BBB8C515-0B55-FD46-A724-6A89111BC227}" type="slidenum">
+              <a:rPr lang="es-ES_tradnl" smtClean="0"/>
+              <a:t>11</a:t>
+            </a:fld>
+            <a:endParaRPr lang="es-ES_tradnl"/>
+          </a:p>
+        </p:txBody>
+      </p:sp>
+    </p:spTree>
+    <p:extLst>
+      <p:ext uri="{BB962C8B-B14F-4D97-AF65-F5344CB8AC3E}">
+        <p14:creationId xmlns:p14="http://schemas.microsoft.com/office/powerpoint/2010/main" val="1164723604"/>
+      </p:ext>
+    </p:extLst>
+  </p:cSld>
+  <p:clrMapOvr>
+    <a:masterClrMapping/>
+  </p:clrMapOvr>
+</p:notes>
+</file>
+
+<file path=ppt/notesSlides/notesSlide11.xml><?xml version="1.0" encoding="utf-8"?>
+<p:notes xmlns:a="http://schemas.openxmlformats.org/drawingml/2006/main" xmlns:r="http://schemas.openxmlformats.org/officeDocument/2006/relationships" xmlns:p="http://schemas.openxmlformats.org/presentationml/2006/main">
+  <p:cSld>
+    <p:spTree>
+      <p:nvGrpSpPr>
+        <p:cNvPr id="1" name=""/>
+        <p:cNvGrpSpPr/>
+        <p:nvPr/>
+      </p:nvGrpSpPr>
+      <p:grpSpPr>
+        <a:xfrm>
+          <a:off x="0" y="0"/>
+          <a:ext cx="0" cy="0"/>
+          <a:chOff x="0" y="0"/>
+          <a:chExt cx="0" cy="0"/>
+        </a:xfrm>
+      </p:grpSpPr>
+      <p:sp>
+        <p:nvSpPr>
+          <p:cNvPr id="2" name="Marcador de imagen de diapositiva 1"/>
+          <p:cNvSpPr>
+            <a:spLocks noGrp="1" noRot="1" noChangeAspect="1"/>
+          </p:cNvSpPr>
+          <p:nvPr>
+            <p:ph type="sldImg"/>
+          </p:nvPr>
+        </p:nvSpPr>
+        <p:spPr/>
+      </p:sp>
+      <p:sp>
+        <p:nvSpPr>
+          <p:cNvPr id="3" name="Marcador de notas 2"/>
+          <p:cNvSpPr>
+            <a:spLocks noGrp="1"/>
+          </p:cNvSpPr>
+          <p:nvPr>
+            <p:ph type="body" idx="1"/>
+          </p:nvPr>
+        </p:nvSpPr>
+        <p:spPr/>
+        <p:txBody>
+          <a:bodyPr/>
+          <a:lstStyle/>
+          <a:p>
             <a:r>
               <a:rPr lang="es-ES_tradnl" dirty="0" smtClean="0"/>
               <a:t>BILUO </a:t>
@@ -9224,7 +9308,7 @@
           <p:nvPr/>
         </p:nvPicPr>
         <p:blipFill>
-          <a:blip r:embed="rId2">
+          <a:blip r:embed="rId3">
             <a:extLst>
               <a:ext uri="{28A0092B-C50C-407E-A947-70E740481C1C}">
                 <a14:useLocalDpi xmlns:a14="http://schemas.microsoft.com/office/drawing/2010/main" val="0"/>
@@ -9302,6 +9386,36 @@
           </a:p>
         </p:txBody>
       </p:sp>
+      <p:pic>
+        <p:nvPicPr>
+          <p:cNvPr id="6" name="Imagen 5"/>
+          <p:cNvPicPr>
+            <a:picLocks noChangeAspect="1"/>
+          </p:cNvPicPr>
+          <p:nvPr/>
+        </p:nvPicPr>
+        <p:blipFill>
+          <a:blip r:embed="rId2">
+            <a:extLst>
+              <a:ext uri="{28A0092B-C50C-407E-A947-70E740481C1C}">
+                <a14:useLocalDpi xmlns:a14="http://schemas.microsoft.com/office/drawing/2010/main" val="0"/>
+              </a:ext>
+            </a:extLst>
+          </a:blip>
+          <a:stretch>
+            <a:fillRect/>
+          </a:stretch>
+        </p:blipFill>
+        <p:spPr>
+          <a:xfrm>
+            <a:off x="338328" y="1788669"/>
+            <a:ext cx="10789920" cy="4865418"/>
+          </a:xfrm>
+          <a:prstGeom prst="rect">
+            <a:avLst/>
+          </a:prstGeom>
+        </p:spPr>
+      </p:pic>
     </p:spTree>
     <p:extLst>
       <p:ext uri="{BB962C8B-B14F-4D97-AF65-F5344CB8AC3E}">

</xml_diff>

<commit_message>
modifications ot the deck and progress on draft of final report
</commit_message>
<xml_diff>
--- a/concept_deck.pptx
+++ b/concept_deck.pptx
@@ -17,9 +17,9 @@
     <p:sldId id="262" r:id="rId8"/>
     <p:sldId id="265" r:id="rId9"/>
     <p:sldId id="267" r:id="rId10"/>
-    <p:sldId id="260" r:id="rId11"/>
-    <p:sldId id="268" r:id="rId12"/>
-    <p:sldId id="269" r:id="rId13"/>
+    <p:sldId id="268" r:id="rId11"/>
+    <p:sldId id="269" r:id="rId12"/>
+    <p:sldId id="260" r:id="rId13"/>
     <p:sldId id="266" r:id="rId14"/>
   </p:sldIdLst>
   <p:sldSz cx="12192000" cy="6858000"/>
@@ -133,9 +133,9 @@
             <p14:sldId id="262"/>
             <p14:sldId id="265"/>
             <p14:sldId id="267"/>
-            <p14:sldId id="260"/>
             <p14:sldId id="268"/>
             <p14:sldId id="269"/>
+            <p14:sldId id="260"/>
             <p14:sldId id="266"/>
           </p14:sldIdLst>
         </p14:section>
@@ -163,7 +163,6 @@
   </mc:AlternateContent>
   <c:chart>
     <c:title>
-      <c:layout/>
       <c:overlay val="0"/>
       <c:spPr>
         <a:noFill/>
@@ -385,11 +384,11 @@
           <c:showPercent val="0"/>
           <c:showBubbleSize val="0"/>
         </c:dLbls>
-        <c:axId val="1521217232"/>
-        <c:axId val="1520904432"/>
+        <c:axId val="-156639344"/>
+        <c:axId val="-156423936"/>
       </c:scatterChart>
       <c:valAx>
-        <c:axId val="1521217232"/>
+        <c:axId val="-156639344"/>
         <c:scaling>
           <c:orientation val="minMax"/>
         </c:scaling>
@@ -446,12 +445,12 @@
             <a:endParaRPr lang="es-ES_tradnl"/>
           </a:p>
         </c:txPr>
-        <c:crossAx val="1520904432"/>
+        <c:crossAx val="-156423936"/>
         <c:crosses val="autoZero"/>
         <c:crossBetween val="midCat"/>
       </c:valAx>
       <c:valAx>
-        <c:axId val="1520904432"/>
+        <c:axId val="-156423936"/>
         <c:scaling>
           <c:orientation val="minMax"/>
         </c:scaling>
@@ -507,7 +506,7 @@
             <a:endParaRPr lang="es-ES_tradnl"/>
           </a:p>
         </c:txPr>
-        <c:crossAx val="1521217232"/>
+        <c:crossAx val="-156639344"/>
         <c:crosses val="autoZero"/>
         <c:crossBetween val="midCat"/>
       </c:valAx>
@@ -1184,7 +1183,7 @@
           <a:p>
             <a:fld id="{34DDFE29-8992-9E49-B735-6F92F26FA036}" type="datetimeFigureOut">
               <a:rPr lang="es-ES_tradnl" smtClean="0"/>
-              <a:t>30/5/18</a:t>
+              <a:t>2/6/18</a:t>
             </a:fld>
             <a:endParaRPr lang="es-ES_tradnl"/>
           </a:p>
@@ -1616,6 +1615,301 @@
           <a:bodyPr/>
           <a:lstStyle/>
           <a:p>
+            <a:pPr marL="0" marR="0" lvl="0" indent="0" defTabSz="914400" eaLnBrk="1" fontAlgn="auto" latinLnBrk="0" hangingPunct="1">
+              <a:lnSpc>
+                <a:spcPct val="100000"/>
+              </a:lnSpc>
+              <a:spcBef>
+                <a:spcPts val="0"/>
+              </a:spcBef>
+              <a:spcAft>
+                <a:spcPts val="0"/>
+              </a:spcAft>
+              <a:buClrTx/>
+              <a:buSzTx/>
+              <a:buFontTx/>
+              <a:buNone/>
+              <a:tabLst/>
+              <a:defRPr/>
+            </a:pPr>
+            <a:r>
+              <a:rPr lang="es-ES_tradnl" dirty="0" err="1" smtClean="0"/>
+              <a:t>Baseline</a:t>
+            </a:r>
+            <a:r>
+              <a:rPr lang="es-ES_tradnl" dirty="0" smtClean="0"/>
+              <a:t>: - </a:t>
+            </a:r>
+            <a:r>
+              <a:rPr lang="es-ES_tradnl" dirty="0" err="1" smtClean="0"/>
+              <a:t>Benchmark</a:t>
+            </a:r>
+            <a:endParaRPr lang="es-ES_tradnl" dirty="0" smtClean="0"/>
+          </a:p>
+          <a:p>
+            <a:pPr marL="171450" marR="0" lvl="0" indent="-171450" defTabSz="914400" eaLnBrk="1" fontAlgn="auto" latinLnBrk="0" hangingPunct="1">
+              <a:lnSpc>
+                <a:spcPct val="100000"/>
+              </a:lnSpc>
+              <a:spcBef>
+                <a:spcPts val="0"/>
+              </a:spcBef>
+              <a:spcAft>
+                <a:spcPts val="0"/>
+              </a:spcAft>
+              <a:buClrTx/>
+              <a:buSzTx/>
+              <a:buFontTx/>
+              <a:buChar char="-"/>
+              <a:tabLst/>
+              <a:defRPr/>
+            </a:pPr>
+            <a:r>
+              <a:rPr lang="es-ES_tradnl" dirty="0" err="1" smtClean="0"/>
+              <a:t>Best</a:t>
+            </a:r>
+            <a:r>
+              <a:rPr lang="es-ES_tradnl" baseline="0" dirty="0" smtClean="0"/>
+              <a:t> of </a:t>
+            </a:r>
+            <a:r>
+              <a:rPr lang="es-ES_tradnl" baseline="0" dirty="0" err="1" smtClean="0"/>
+              <a:t>Market</a:t>
+            </a:r>
+            <a:r>
+              <a:rPr lang="es-ES_tradnl" baseline="0" dirty="0" smtClean="0"/>
+              <a:t> (93% in </a:t>
+            </a:r>
+            <a:r>
+              <a:rPr lang="es-ES_tradnl" baseline="0" dirty="0" err="1" smtClean="0"/>
+              <a:t>entity</a:t>
+            </a:r>
+            <a:r>
+              <a:rPr lang="es-ES_tradnl" baseline="0" dirty="0" smtClean="0"/>
+              <a:t> </a:t>
+            </a:r>
+            <a:r>
+              <a:rPr lang="es-ES_tradnl" baseline="0" dirty="0" err="1" smtClean="0"/>
+              <a:t>recognition</a:t>
+            </a:r>
+            <a:r>
+              <a:rPr lang="es-ES_tradnl" baseline="0" dirty="0" smtClean="0"/>
+              <a:t>): Human </a:t>
+            </a:r>
+            <a:r>
+              <a:rPr lang="es-ES_tradnl" baseline="0" dirty="0" err="1" smtClean="0"/>
+              <a:t>analyst</a:t>
+            </a:r>
+            <a:r>
+              <a:rPr lang="es-ES_tradnl" baseline="0" dirty="0" smtClean="0"/>
+              <a:t> 97%</a:t>
+            </a:r>
+            <a:endParaRPr lang="es-ES_tradnl" dirty="0" smtClean="0"/>
+          </a:p>
+          <a:p>
+            <a:pPr marL="0" marR="0" lvl="0" indent="0" defTabSz="914400" eaLnBrk="1" fontAlgn="auto" latinLnBrk="0" hangingPunct="1">
+              <a:lnSpc>
+                <a:spcPct val="100000"/>
+              </a:lnSpc>
+              <a:spcBef>
+                <a:spcPts val="0"/>
+              </a:spcBef>
+              <a:spcAft>
+                <a:spcPts val="0"/>
+              </a:spcAft>
+              <a:buClrTx/>
+              <a:buSzTx/>
+              <a:buFontTx/>
+              <a:buNone/>
+              <a:tabLst/>
+              <a:defRPr/>
+            </a:pPr>
+            <a:endParaRPr lang="es-ES_tradnl" dirty="0" smtClean="0"/>
+          </a:p>
+          <a:p>
+            <a:pPr marL="0" marR="0" lvl="0" indent="0" defTabSz="914400" eaLnBrk="1" fontAlgn="auto" latinLnBrk="0" hangingPunct="1">
+              <a:lnSpc>
+                <a:spcPct val="100000"/>
+              </a:lnSpc>
+              <a:spcBef>
+                <a:spcPts val="0"/>
+              </a:spcBef>
+              <a:spcAft>
+                <a:spcPts val="0"/>
+              </a:spcAft>
+              <a:buClrTx/>
+              <a:buSzTx/>
+              <a:buFontTx/>
+              <a:buNone/>
+              <a:tabLst/>
+              <a:defRPr/>
+            </a:pPr>
+            <a:r>
+              <a:rPr lang="es-ES_tradnl" dirty="0" err="1" smtClean="0"/>
+              <a:t>Accuracy</a:t>
+            </a:r>
+            <a:r>
+              <a:rPr lang="es-ES_tradnl" dirty="0" smtClean="0"/>
+              <a:t> </a:t>
+            </a:r>
+            <a:r>
+              <a:rPr lang="es-ES_tradnl" dirty="0" err="1" smtClean="0"/>
+              <a:t>Metric</a:t>
+            </a:r>
+            <a:endParaRPr lang="es-ES_tradnl" dirty="0" smtClean="0"/>
+          </a:p>
+          <a:p>
+            <a:pPr marR="0" lvl="0" defTabSz="914400" eaLnBrk="1" fontAlgn="auto" latinLnBrk="0" hangingPunct="1">
+              <a:lnSpc>
+                <a:spcPct val="100000"/>
+              </a:lnSpc>
+              <a:spcBef>
+                <a:spcPts val="0"/>
+              </a:spcBef>
+              <a:spcAft>
+                <a:spcPts val="0"/>
+              </a:spcAft>
+              <a:buClrTx/>
+              <a:buSzTx/>
+              <a:buFontTx/>
+              <a:buChar char="-"/>
+              <a:tabLst/>
+              <a:defRPr/>
+            </a:pPr>
+            <a:r>
+              <a:rPr lang="es-ES_tradnl" dirty="0" smtClean="0"/>
+              <a:t> </a:t>
+            </a:r>
+            <a:r>
+              <a:rPr lang="es-ES_tradnl" dirty="0" err="1" smtClean="0"/>
+              <a:t>What</a:t>
+            </a:r>
+            <a:r>
+              <a:rPr lang="es-ES_tradnl" dirty="0" smtClean="0"/>
+              <a:t> </a:t>
+            </a:r>
+            <a:r>
+              <a:rPr lang="es-ES_tradnl" dirty="0" err="1" smtClean="0"/>
+              <a:t>is</a:t>
+            </a:r>
+            <a:r>
+              <a:rPr lang="es-ES_tradnl" dirty="0" smtClean="0"/>
+              <a:t> </a:t>
+            </a:r>
+            <a:r>
+              <a:rPr lang="es-ES_tradnl" dirty="0" err="1" smtClean="0"/>
+              <a:t>accuracy</a:t>
+            </a:r>
+            <a:r>
+              <a:rPr lang="es-ES_tradnl" dirty="0" smtClean="0"/>
+              <a:t> in </a:t>
+            </a:r>
+            <a:r>
+              <a:rPr lang="es-ES_tradnl" dirty="0" err="1" smtClean="0"/>
+              <a:t>this</a:t>
+            </a:r>
+            <a:r>
+              <a:rPr lang="es-ES_tradnl" dirty="0" smtClean="0"/>
+              <a:t> </a:t>
+            </a:r>
+            <a:r>
+              <a:rPr lang="es-ES_tradnl" dirty="0" err="1" smtClean="0"/>
+              <a:t>context</a:t>
+            </a:r>
+            <a:r>
+              <a:rPr lang="es-ES_tradnl" dirty="0" smtClean="0"/>
+              <a:t>: </a:t>
+            </a:r>
+          </a:p>
+          <a:p>
+            <a:pPr marR="0" lvl="0" defTabSz="914400" eaLnBrk="1" fontAlgn="auto" latinLnBrk="0" hangingPunct="1">
+              <a:lnSpc>
+                <a:spcPct val="100000"/>
+              </a:lnSpc>
+              <a:spcBef>
+                <a:spcPts val="0"/>
+              </a:spcBef>
+              <a:spcAft>
+                <a:spcPts val="0"/>
+              </a:spcAft>
+              <a:buClrTx/>
+              <a:buSzTx/>
+              <a:buFontTx/>
+              <a:buChar char="-"/>
+              <a:tabLst/>
+              <a:defRPr/>
+            </a:pPr>
+            <a:r>
+              <a:rPr lang="es-ES_tradnl" dirty="0" smtClean="0"/>
+              <a:t> </a:t>
+            </a:r>
+            <a:r>
+              <a:rPr lang="es-ES_tradnl" dirty="0" err="1" smtClean="0"/>
+              <a:t>What</a:t>
+            </a:r>
+            <a:r>
+              <a:rPr lang="es-ES_tradnl" dirty="0" smtClean="0"/>
+              <a:t> are </a:t>
+            </a:r>
+            <a:r>
+              <a:rPr lang="es-ES_tradnl" dirty="0" err="1" smtClean="0"/>
+              <a:t>going</a:t>
+            </a:r>
+            <a:r>
+              <a:rPr lang="es-ES_tradnl" dirty="0" smtClean="0"/>
+              <a:t> to</a:t>
+            </a:r>
+            <a:r>
+              <a:rPr lang="es-ES_tradnl" baseline="0" dirty="0" smtClean="0"/>
+              <a:t> be </a:t>
+            </a:r>
+            <a:r>
+              <a:rPr lang="es-ES_tradnl" baseline="0" dirty="0" err="1" smtClean="0"/>
+              <a:t>measuring</a:t>
+            </a:r>
+            <a:endParaRPr lang="es-ES_tradnl" dirty="0" smtClean="0"/>
+          </a:p>
+          <a:p>
+            <a:pPr marL="0" marR="0" lvl="0" indent="0" defTabSz="914400" eaLnBrk="1" fontAlgn="auto" latinLnBrk="0" hangingPunct="1">
+              <a:lnSpc>
+                <a:spcPct val="100000"/>
+              </a:lnSpc>
+              <a:spcBef>
+                <a:spcPts val="0"/>
+              </a:spcBef>
+              <a:spcAft>
+                <a:spcPts val="0"/>
+              </a:spcAft>
+              <a:buClrTx/>
+              <a:buSzTx/>
+              <a:buFontTx/>
+              <a:buNone/>
+              <a:tabLst/>
+              <a:defRPr/>
+            </a:pPr>
+            <a:endParaRPr lang="es-ES_tradnl" dirty="0" smtClean="0"/>
+          </a:p>
+          <a:p>
+            <a:pPr marL="0" marR="0" lvl="0" indent="0" defTabSz="914400" eaLnBrk="1" fontAlgn="auto" latinLnBrk="0" hangingPunct="1">
+              <a:lnSpc>
+                <a:spcPct val="100000"/>
+              </a:lnSpc>
+              <a:spcBef>
+                <a:spcPts val="0"/>
+              </a:spcBef>
+              <a:spcAft>
+                <a:spcPts val="0"/>
+              </a:spcAft>
+              <a:buClrTx/>
+              <a:buSzTx/>
+              <a:buFontTx/>
+              <a:buNone/>
+              <a:tabLst/>
+              <a:defRPr/>
+            </a:pPr>
+            <a:endParaRPr lang="es-ES_tradnl" dirty="0" smtClean="0"/>
+          </a:p>
+          <a:p>
             <a:endParaRPr lang="es-ES_tradnl" dirty="0"/>
           </a:p>
         </p:txBody>
@@ -1637,7 +1931,7 @@
           <a:p>
             <a:fld id="{BBB8C515-0B55-FD46-A724-6A89111BC227}" type="slidenum">
               <a:rPr lang="es-ES_tradnl" smtClean="0"/>
-              <a:t>11</a:t>
+              <a:t>12</a:t>
             </a:fld>
             <a:endParaRPr lang="es-ES_tradnl"/>
           </a:p>
@@ -1646,7 +1940,7 @@
     </p:spTree>
     <p:extLst>
       <p:ext uri="{BB962C8B-B14F-4D97-AF65-F5344CB8AC3E}">
-        <p14:creationId xmlns:p14="http://schemas.microsoft.com/office/powerpoint/2010/main" val="1164723604"/>
+        <p14:creationId xmlns:p14="http://schemas.microsoft.com/office/powerpoint/2010/main" val="541556466"/>
       </p:ext>
     </p:extLst>
   </p:cSld>
@@ -4150,7 +4444,6 @@
               <a:rPr lang="es-ES_tradnl" dirty="0" smtClean="0"/>
               <a:t>: </a:t>
             </a:r>
-            <a:endParaRPr lang="es-ES_tradnl" dirty="0" smtClean="0"/>
           </a:p>
           <a:p>
             <a:pPr marR="0" lvl="0" defTabSz="914400" eaLnBrk="1" fontAlgn="auto" latinLnBrk="0" hangingPunct="1">
@@ -4325,302 +4618,6 @@
           <a:bodyPr/>
           <a:lstStyle/>
           <a:p>
-            <a:pPr marL="0" marR="0" lvl="0" indent="0" defTabSz="914400" eaLnBrk="1" fontAlgn="auto" latinLnBrk="0" hangingPunct="1">
-              <a:lnSpc>
-                <a:spcPct val="100000"/>
-              </a:lnSpc>
-              <a:spcBef>
-                <a:spcPts val="0"/>
-              </a:spcBef>
-              <a:spcAft>
-                <a:spcPts val="0"/>
-              </a:spcAft>
-              <a:buClrTx/>
-              <a:buSzTx/>
-              <a:buFontTx/>
-              <a:buNone/>
-              <a:tabLst/>
-              <a:defRPr/>
-            </a:pPr>
-            <a:r>
-              <a:rPr lang="es-ES_tradnl" dirty="0" err="1" smtClean="0"/>
-              <a:t>Baseline</a:t>
-            </a:r>
-            <a:r>
-              <a:rPr lang="es-ES_tradnl" dirty="0" smtClean="0"/>
-              <a:t>: - </a:t>
-            </a:r>
-            <a:r>
-              <a:rPr lang="es-ES_tradnl" dirty="0" err="1" smtClean="0"/>
-              <a:t>Benchmark</a:t>
-            </a:r>
-            <a:endParaRPr lang="es-ES_tradnl" dirty="0" smtClean="0"/>
-          </a:p>
-          <a:p>
-            <a:pPr marL="171450" marR="0" lvl="0" indent="-171450" defTabSz="914400" eaLnBrk="1" fontAlgn="auto" latinLnBrk="0" hangingPunct="1">
-              <a:lnSpc>
-                <a:spcPct val="100000"/>
-              </a:lnSpc>
-              <a:spcBef>
-                <a:spcPts val="0"/>
-              </a:spcBef>
-              <a:spcAft>
-                <a:spcPts val="0"/>
-              </a:spcAft>
-              <a:buClrTx/>
-              <a:buSzTx/>
-              <a:buFontTx/>
-              <a:buChar char="-"/>
-              <a:tabLst/>
-              <a:defRPr/>
-            </a:pPr>
-            <a:r>
-              <a:rPr lang="es-ES_tradnl" dirty="0" err="1" smtClean="0"/>
-              <a:t>Best</a:t>
-            </a:r>
-            <a:r>
-              <a:rPr lang="es-ES_tradnl" baseline="0" dirty="0" smtClean="0"/>
-              <a:t> of </a:t>
-            </a:r>
-            <a:r>
-              <a:rPr lang="es-ES_tradnl" baseline="0" dirty="0" err="1" smtClean="0"/>
-              <a:t>Market</a:t>
-            </a:r>
-            <a:r>
-              <a:rPr lang="es-ES_tradnl" baseline="0" dirty="0" smtClean="0"/>
-              <a:t> (93% in </a:t>
-            </a:r>
-            <a:r>
-              <a:rPr lang="es-ES_tradnl" baseline="0" dirty="0" err="1" smtClean="0"/>
-              <a:t>entity</a:t>
-            </a:r>
-            <a:r>
-              <a:rPr lang="es-ES_tradnl" baseline="0" dirty="0" smtClean="0"/>
-              <a:t> </a:t>
-            </a:r>
-            <a:r>
-              <a:rPr lang="es-ES_tradnl" baseline="0" dirty="0" err="1" smtClean="0"/>
-              <a:t>recognition</a:t>
-            </a:r>
-            <a:r>
-              <a:rPr lang="es-ES_tradnl" baseline="0" dirty="0" smtClean="0"/>
-              <a:t>): Human </a:t>
-            </a:r>
-            <a:r>
-              <a:rPr lang="es-ES_tradnl" baseline="0" dirty="0" err="1" smtClean="0"/>
-              <a:t>analyst</a:t>
-            </a:r>
-            <a:r>
-              <a:rPr lang="es-ES_tradnl" baseline="0" dirty="0" smtClean="0"/>
-              <a:t> 97%</a:t>
-            </a:r>
-            <a:endParaRPr lang="es-ES_tradnl" dirty="0" smtClean="0"/>
-          </a:p>
-          <a:p>
-            <a:pPr marL="0" marR="0" lvl="0" indent="0" defTabSz="914400" eaLnBrk="1" fontAlgn="auto" latinLnBrk="0" hangingPunct="1">
-              <a:lnSpc>
-                <a:spcPct val="100000"/>
-              </a:lnSpc>
-              <a:spcBef>
-                <a:spcPts val="0"/>
-              </a:spcBef>
-              <a:spcAft>
-                <a:spcPts val="0"/>
-              </a:spcAft>
-              <a:buClrTx/>
-              <a:buSzTx/>
-              <a:buFontTx/>
-              <a:buNone/>
-              <a:tabLst/>
-              <a:defRPr/>
-            </a:pPr>
-            <a:endParaRPr lang="es-ES_tradnl" dirty="0" smtClean="0"/>
-          </a:p>
-          <a:p>
-            <a:pPr marL="0" marR="0" lvl="0" indent="0" defTabSz="914400" eaLnBrk="1" fontAlgn="auto" latinLnBrk="0" hangingPunct="1">
-              <a:lnSpc>
-                <a:spcPct val="100000"/>
-              </a:lnSpc>
-              <a:spcBef>
-                <a:spcPts val="0"/>
-              </a:spcBef>
-              <a:spcAft>
-                <a:spcPts val="0"/>
-              </a:spcAft>
-              <a:buClrTx/>
-              <a:buSzTx/>
-              <a:buFontTx/>
-              <a:buNone/>
-              <a:tabLst/>
-              <a:defRPr/>
-            </a:pPr>
-            <a:r>
-              <a:rPr lang="es-ES_tradnl" dirty="0" err="1" smtClean="0"/>
-              <a:t>Accuracy</a:t>
-            </a:r>
-            <a:r>
-              <a:rPr lang="es-ES_tradnl" dirty="0" smtClean="0"/>
-              <a:t> </a:t>
-            </a:r>
-            <a:r>
-              <a:rPr lang="es-ES_tradnl" dirty="0" err="1" smtClean="0"/>
-              <a:t>Metric</a:t>
-            </a:r>
-            <a:endParaRPr lang="es-ES_tradnl" dirty="0" smtClean="0"/>
-          </a:p>
-          <a:p>
-            <a:pPr marR="0" lvl="0" defTabSz="914400" eaLnBrk="1" fontAlgn="auto" latinLnBrk="0" hangingPunct="1">
-              <a:lnSpc>
-                <a:spcPct val="100000"/>
-              </a:lnSpc>
-              <a:spcBef>
-                <a:spcPts val="0"/>
-              </a:spcBef>
-              <a:spcAft>
-                <a:spcPts val="0"/>
-              </a:spcAft>
-              <a:buClrTx/>
-              <a:buSzTx/>
-              <a:buFontTx/>
-              <a:buChar char="-"/>
-              <a:tabLst/>
-              <a:defRPr/>
-            </a:pPr>
-            <a:r>
-              <a:rPr lang="es-ES_tradnl" dirty="0" smtClean="0"/>
-              <a:t> </a:t>
-            </a:r>
-            <a:r>
-              <a:rPr lang="es-ES_tradnl" dirty="0" err="1" smtClean="0"/>
-              <a:t>What</a:t>
-            </a:r>
-            <a:r>
-              <a:rPr lang="es-ES_tradnl" dirty="0" smtClean="0"/>
-              <a:t> </a:t>
-            </a:r>
-            <a:r>
-              <a:rPr lang="es-ES_tradnl" dirty="0" err="1" smtClean="0"/>
-              <a:t>is</a:t>
-            </a:r>
-            <a:r>
-              <a:rPr lang="es-ES_tradnl" dirty="0" smtClean="0"/>
-              <a:t> </a:t>
-            </a:r>
-            <a:r>
-              <a:rPr lang="es-ES_tradnl" dirty="0" err="1" smtClean="0"/>
-              <a:t>accuracy</a:t>
-            </a:r>
-            <a:r>
-              <a:rPr lang="es-ES_tradnl" dirty="0" smtClean="0"/>
-              <a:t> in </a:t>
-            </a:r>
-            <a:r>
-              <a:rPr lang="es-ES_tradnl" dirty="0" err="1" smtClean="0"/>
-              <a:t>this</a:t>
-            </a:r>
-            <a:r>
-              <a:rPr lang="es-ES_tradnl" dirty="0" smtClean="0"/>
-              <a:t> </a:t>
-            </a:r>
-            <a:r>
-              <a:rPr lang="es-ES_tradnl" dirty="0" err="1" smtClean="0"/>
-              <a:t>context</a:t>
-            </a:r>
-            <a:r>
-              <a:rPr lang="es-ES_tradnl" dirty="0" smtClean="0"/>
-              <a:t>: </a:t>
-            </a:r>
-            <a:endParaRPr lang="es-ES_tradnl" dirty="0" smtClean="0"/>
-          </a:p>
-          <a:p>
-            <a:pPr marR="0" lvl="0" defTabSz="914400" eaLnBrk="1" fontAlgn="auto" latinLnBrk="0" hangingPunct="1">
-              <a:lnSpc>
-                <a:spcPct val="100000"/>
-              </a:lnSpc>
-              <a:spcBef>
-                <a:spcPts val="0"/>
-              </a:spcBef>
-              <a:spcAft>
-                <a:spcPts val="0"/>
-              </a:spcAft>
-              <a:buClrTx/>
-              <a:buSzTx/>
-              <a:buFontTx/>
-              <a:buChar char="-"/>
-              <a:tabLst/>
-              <a:defRPr/>
-            </a:pPr>
-            <a:r>
-              <a:rPr lang="es-ES_tradnl" dirty="0" smtClean="0"/>
-              <a:t> </a:t>
-            </a:r>
-            <a:r>
-              <a:rPr lang="es-ES_tradnl" dirty="0" err="1" smtClean="0"/>
-              <a:t>What</a:t>
-            </a:r>
-            <a:r>
-              <a:rPr lang="es-ES_tradnl" dirty="0" smtClean="0"/>
-              <a:t> are </a:t>
-            </a:r>
-            <a:r>
-              <a:rPr lang="es-ES_tradnl" dirty="0" err="1" smtClean="0"/>
-              <a:t>going</a:t>
-            </a:r>
-            <a:r>
-              <a:rPr lang="es-ES_tradnl" dirty="0" smtClean="0"/>
-              <a:t> to</a:t>
-            </a:r>
-            <a:r>
-              <a:rPr lang="es-ES_tradnl" baseline="0" dirty="0" smtClean="0"/>
-              <a:t> be </a:t>
-            </a:r>
-            <a:r>
-              <a:rPr lang="es-ES_tradnl" baseline="0" dirty="0" err="1" smtClean="0"/>
-              <a:t>measuring</a:t>
-            </a:r>
-            <a:endParaRPr lang="es-ES_tradnl" dirty="0" smtClean="0"/>
-          </a:p>
-          <a:p>
-            <a:pPr marL="0" marR="0" lvl="0" indent="0" defTabSz="914400" eaLnBrk="1" fontAlgn="auto" latinLnBrk="0" hangingPunct="1">
-              <a:lnSpc>
-                <a:spcPct val="100000"/>
-              </a:lnSpc>
-              <a:spcBef>
-                <a:spcPts val="0"/>
-              </a:spcBef>
-              <a:spcAft>
-                <a:spcPts val="0"/>
-              </a:spcAft>
-              <a:buClrTx/>
-              <a:buSzTx/>
-              <a:buFontTx/>
-              <a:buNone/>
-              <a:tabLst/>
-              <a:defRPr/>
-            </a:pPr>
-            <a:endParaRPr lang="es-ES_tradnl" dirty="0" smtClean="0"/>
-          </a:p>
-          <a:p>
-            <a:pPr marL="0" marR="0" lvl="0" indent="0" defTabSz="914400" eaLnBrk="1" fontAlgn="auto" latinLnBrk="0" hangingPunct="1">
-              <a:lnSpc>
-                <a:spcPct val="100000"/>
-              </a:lnSpc>
-              <a:spcBef>
-                <a:spcPts val="0"/>
-              </a:spcBef>
-              <a:spcAft>
-                <a:spcPts val="0"/>
-              </a:spcAft>
-              <a:buClrTx/>
-              <a:buSzTx/>
-              <a:buFontTx/>
-              <a:buNone/>
-              <a:tabLst/>
-              <a:defRPr/>
-            </a:pPr>
-            <a:endParaRPr lang="es-ES_tradnl" dirty="0" smtClean="0"/>
-          </a:p>
-          <a:p>
             <a:endParaRPr lang="es-ES_tradnl" dirty="0"/>
           </a:p>
         </p:txBody>
@@ -4651,7 +4648,7 @@
     </p:spTree>
     <p:extLst>
       <p:ext uri="{BB962C8B-B14F-4D97-AF65-F5344CB8AC3E}">
-        <p14:creationId xmlns:p14="http://schemas.microsoft.com/office/powerpoint/2010/main" val="541556466"/>
+        <p14:creationId xmlns:p14="http://schemas.microsoft.com/office/powerpoint/2010/main" val="1164723604"/>
       </p:ext>
     </p:extLst>
   </p:cSld>
@@ -5162,7 +5159,7 @@
           <a:p>
             <a:fld id="{5959B7D5-5278-284E-8486-CD29CE3F67CF}" type="datetimeFigureOut">
               <a:rPr lang="es-ES_tradnl" smtClean="0"/>
-              <a:t>30/5/18</a:t>
+              <a:t>2/6/18</a:t>
             </a:fld>
             <a:endParaRPr lang="es-ES_tradnl"/>
           </a:p>
@@ -5337,7 +5334,7 @@
           <a:p>
             <a:fld id="{5959B7D5-5278-284E-8486-CD29CE3F67CF}" type="datetimeFigureOut">
               <a:rPr lang="es-ES_tradnl" smtClean="0"/>
-              <a:t>30/5/18</a:t>
+              <a:t>2/6/18</a:t>
             </a:fld>
             <a:endParaRPr lang="es-ES_tradnl"/>
           </a:p>
@@ -5513,7 +5510,7 @@
           <a:p>
             <a:fld id="{5959B7D5-5278-284E-8486-CD29CE3F67CF}" type="datetimeFigureOut">
               <a:rPr lang="es-ES_tradnl" smtClean="0"/>
-              <a:t>30/5/18</a:t>
+              <a:t>2/6/18</a:t>
             </a:fld>
             <a:endParaRPr lang="es-ES_tradnl"/>
           </a:p>
@@ -5679,7 +5676,7 @@
           <a:p>
             <a:fld id="{5959B7D5-5278-284E-8486-CD29CE3F67CF}" type="datetimeFigureOut">
               <a:rPr lang="es-ES_tradnl" smtClean="0"/>
-              <a:t>30/5/18</a:t>
+              <a:t>2/6/18</a:t>
             </a:fld>
             <a:endParaRPr lang="es-ES_tradnl"/>
           </a:p>
@@ -5996,7 +5993,7 @@
           <a:p>
             <a:fld id="{5959B7D5-5278-284E-8486-CD29CE3F67CF}" type="datetimeFigureOut">
               <a:rPr lang="es-ES_tradnl" smtClean="0"/>
-              <a:t>30/5/18</a:t>
+              <a:t>2/6/18</a:t>
             </a:fld>
             <a:endParaRPr lang="es-ES_tradnl"/>
           </a:p>
@@ -6452,7 +6449,7 @@
           <a:p>
             <a:fld id="{5959B7D5-5278-284E-8486-CD29CE3F67CF}" type="datetimeFigureOut">
               <a:rPr lang="es-ES_tradnl" smtClean="0"/>
-              <a:t>30/5/18</a:t>
+              <a:t>2/6/18</a:t>
             </a:fld>
             <a:endParaRPr lang="es-ES_tradnl"/>
           </a:p>
@@ -6859,7 +6856,7 @@
           <a:p>
             <a:fld id="{5959B7D5-5278-284E-8486-CD29CE3F67CF}" type="datetimeFigureOut">
               <a:rPr lang="es-ES_tradnl" smtClean="0"/>
-              <a:t>30/5/18</a:t>
+              <a:t>2/6/18</a:t>
             </a:fld>
             <a:endParaRPr lang="es-ES_tradnl"/>
           </a:p>
@@ -6973,7 +6970,7 @@
           <a:p>
             <a:fld id="{5959B7D5-5278-284E-8486-CD29CE3F67CF}" type="datetimeFigureOut">
               <a:rPr lang="es-ES_tradnl" smtClean="0"/>
-              <a:t>30/5/18</a:t>
+              <a:t>2/6/18</a:t>
             </a:fld>
             <a:endParaRPr lang="es-ES_tradnl"/>
           </a:p>
@@ -7087,7 +7084,7 @@
           <a:p>
             <a:fld id="{5959B7D5-5278-284E-8486-CD29CE3F67CF}" type="datetimeFigureOut">
               <a:rPr lang="es-ES_tradnl" smtClean="0"/>
-              <a:t>30/5/18</a:t>
+              <a:t>2/6/18</a:t>
             </a:fld>
             <a:endParaRPr lang="es-ES_tradnl"/>
           </a:p>
@@ -7441,7 +7438,7 @@
           <a:p>
             <a:fld id="{5959B7D5-5278-284E-8486-CD29CE3F67CF}" type="datetimeFigureOut">
               <a:rPr lang="es-ES_tradnl" smtClean="0"/>
-              <a:t>30/5/18</a:t>
+              <a:t>2/6/18</a:t>
             </a:fld>
             <a:endParaRPr lang="es-ES_tradnl"/>
           </a:p>
@@ -7944,7 +7941,7 @@
           <a:p>
             <a:fld id="{5959B7D5-5278-284E-8486-CD29CE3F67CF}" type="datetimeFigureOut">
               <a:rPr lang="es-ES_tradnl" smtClean="0"/>
-              <a:t>30/5/18</a:t>
+              <a:t>2/6/18</a:t>
             </a:fld>
             <a:endParaRPr lang="es-ES_tradnl"/>
           </a:p>
@@ -8295,7 +8292,7 @@
           <a:p>
             <a:fld id="{5959B7D5-5278-284E-8486-CD29CE3F67CF}" type="datetimeFigureOut">
               <a:rPr lang="es-ES_tradnl" smtClean="0"/>
-              <a:t>30/5/18</a:t>
+              <a:t>2/6/18</a:t>
             </a:fld>
             <a:endParaRPr lang="es-ES_tradnl"/>
           </a:p>
@@ -9140,6 +9137,194 @@
           <a:lstStyle/>
           <a:p>
             <a:r>
+              <a:rPr lang="es-ES_tradnl" dirty="0" err="1" smtClean="0"/>
+              <a:t>Example</a:t>
+            </a:r>
+            <a:r>
+              <a:rPr lang="es-ES_tradnl" dirty="0" smtClean="0"/>
+              <a:t> 1</a:t>
+            </a:r>
+            <a:endParaRPr lang="es-ES_tradnl" dirty="0"/>
+          </a:p>
+        </p:txBody>
+      </p:sp>
+      <p:pic>
+        <p:nvPicPr>
+          <p:cNvPr id="4" name="Imagen 3"/>
+          <p:cNvPicPr>
+            <a:picLocks noChangeAspect="1"/>
+          </p:cNvPicPr>
+          <p:nvPr/>
+        </p:nvPicPr>
+        <p:blipFill>
+          <a:blip r:embed="rId3">
+            <a:extLst>
+              <a:ext uri="{28A0092B-C50C-407E-A947-70E740481C1C}">
+                <a14:useLocalDpi xmlns:a14="http://schemas.microsoft.com/office/drawing/2010/main" val="0"/>
+              </a:ext>
+            </a:extLst>
+          </a:blip>
+          <a:stretch>
+            <a:fillRect/>
+          </a:stretch>
+        </p:blipFill>
+        <p:spPr>
+          <a:xfrm>
+            <a:off x="914400" y="1767841"/>
+            <a:ext cx="10789920" cy="3893790"/>
+          </a:xfrm>
+          <a:prstGeom prst="rect">
+            <a:avLst/>
+          </a:prstGeom>
+        </p:spPr>
+      </p:pic>
+    </p:spTree>
+    <p:extLst>
+      <p:ext uri="{BB962C8B-B14F-4D97-AF65-F5344CB8AC3E}">
+        <p14:creationId xmlns:p14="http://schemas.microsoft.com/office/powerpoint/2010/main" val="1707600574"/>
+      </p:ext>
+    </p:extLst>
+  </p:cSld>
+  <p:clrMapOvr>
+    <a:masterClrMapping/>
+  </p:clrMapOvr>
+  <p:timing>
+    <p:tnLst>
+      <p:par>
+        <p:cTn id="1" dur="indefinite" restart="never" nodeType="tmRoot"/>
+      </p:par>
+    </p:tnLst>
+  </p:timing>
+</p:sld>
+</file>
+
+<file path=ppt/slides/slide11.xml><?xml version="1.0" encoding="utf-8"?>
+<p:sld xmlns:a="http://schemas.openxmlformats.org/drawingml/2006/main" xmlns:r="http://schemas.openxmlformats.org/officeDocument/2006/relationships" xmlns:p="http://schemas.openxmlformats.org/presentationml/2006/main">
+  <p:cSld>
+    <p:spTree>
+      <p:nvGrpSpPr>
+        <p:cNvPr id="1" name=""/>
+        <p:cNvGrpSpPr/>
+        <p:nvPr/>
+      </p:nvGrpSpPr>
+      <p:grpSpPr>
+        <a:xfrm>
+          <a:off x="0" y="0"/>
+          <a:ext cx="0" cy="0"/>
+          <a:chOff x="0" y="0"/>
+          <a:chExt cx="0" cy="0"/>
+        </a:xfrm>
+      </p:grpSpPr>
+      <p:sp>
+        <p:nvSpPr>
+          <p:cNvPr id="2" name="Título 1"/>
+          <p:cNvSpPr>
+            <a:spLocks noGrp="1"/>
+          </p:cNvSpPr>
+          <p:nvPr>
+            <p:ph type="title"/>
+          </p:nvPr>
+        </p:nvSpPr>
+        <p:spPr/>
+        <p:txBody>
+          <a:bodyPr/>
+          <a:lstStyle/>
+          <a:p>
+            <a:r>
+              <a:rPr lang="es-ES_tradnl" dirty="0" err="1" smtClean="0"/>
+              <a:t>Example</a:t>
+            </a:r>
+            <a:r>
+              <a:rPr lang="es-ES_tradnl" dirty="0" smtClean="0"/>
+              <a:t> 2</a:t>
+            </a:r>
+            <a:endParaRPr lang="es-ES_tradnl" dirty="0"/>
+          </a:p>
+        </p:txBody>
+      </p:sp>
+      <p:pic>
+        <p:nvPicPr>
+          <p:cNvPr id="6" name="Imagen 5"/>
+          <p:cNvPicPr>
+            <a:picLocks noChangeAspect="1"/>
+          </p:cNvPicPr>
+          <p:nvPr/>
+        </p:nvPicPr>
+        <p:blipFill>
+          <a:blip r:embed="rId2">
+            <a:extLst>
+              <a:ext uri="{28A0092B-C50C-407E-A947-70E740481C1C}">
+                <a14:useLocalDpi xmlns:a14="http://schemas.microsoft.com/office/drawing/2010/main" val="0"/>
+              </a:ext>
+            </a:extLst>
+          </a:blip>
+          <a:stretch>
+            <a:fillRect/>
+          </a:stretch>
+        </p:blipFill>
+        <p:spPr>
+          <a:xfrm>
+            <a:off x="338328" y="1788669"/>
+            <a:ext cx="10789920" cy="4865418"/>
+          </a:xfrm>
+          <a:prstGeom prst="rect">
+            <a:avLst/>
+          </a:prstGeom>
+        </p:spPr>
+      </p:pic>
+    </p:spTree>
+    <p:extLst>
+      <p:ext uri="{BB962C8B-B14F-4D97-AF65-F5344CB8AC3E}">
+        <p14:creationId xmlns:p14="http://schemas.microsoft.com/office/powerpoint/2010/main" val="671388710"/>
+      </p:ext>
+    </p:extLst>
+  </p:cSld>
+  <p:clrMapOvr>
+    <a:masterClrMapping/>
+  </p:clrMapOvr>
+  <p:timing>
+    <p:tnLst>
+      <p:par>
+        <p:cTn id="1" dur="indefinite" restart="never" nodeType="tmRoot"/>
+      </p:par>
+    </p:tnLst>
+  </p:timing>
+</p:sld>
+</file>
+
+<file path=ppt/slides/slide12.xml><?xml version="1.0" encoding="utf-8"?>
+<p:sld xmlns:a="http://schemas.openxmlformats.org/drawingml/2006/main" xmlns:r="http://schemas.openxmlformats.org/officeDocument/2006/relationships" xmlns:p="http://schemas.openxmlformats.org/presentationml/2006/main">
+  <p:cSld>
+    <p:spTree>
+      <p:nvGrpSpPr>
+        <p:cNvPr id="1" name=""/>
+        <p:cNvGrpSpPr/>
+        <p:nvPr/>
+      </p:nvGrpSpPr>
+      <p:grpSpPr>
+        <a:xfrm>
+          <a:off x="0" y="0"/>
+          <a:ext cx="0" cy="0"/>
+          <a:chOff x="0" y="0"/>
+          <a:chExt cx="0" cy="0"/>
+        </a:xfrm>
+      </p:grpSpPr>
+      <p:sp>
+        <p:nvSpPr>
+          <p:cNvPr id="2" name="Título 1"/>
+          <p:cNvSpPr>
+            <a:spLocks noGrp="1"/>
+          </p:cNvSpPr>
+          <p:nvPr>
+            <p:ph type="title"/>
+          </p:nvPr>
+        </p:nvSpPr>
+        <p:spPr/>
+        <p:txBody>
+          <a:bodyPr/>
+          <a:lstStyle/>
+          <a:p>
+            <a:r>
               <a:rPr lang="es-ES_tradnl" dirty="0" smtClean="0"/>
               <a:t>Performance: ACCURACY</a:t>
             </a:r>
@@ -9255,180 +9440,6 @@
 </p:sld>
 </file>
 
-<file path=ppt/slides/slide11.xml><?xml version="1.0" encoding="utf-8"?>
-<p:sld xmlns:a="http://schemas.openxmlformats.org/drawingml/2006/main" xmlns:r="http://schemas.openxmlformats.org/officeDocument/2006/relationships" xmlns:p="http://schemas.openxmlformats.org/presentationml/2006/main">
-  <p:cSld>
-    <p:spTree>
-      <p:nvGrpSpPr>
-        <p:cNvPr id="1" name=""/>
-        <p:cNvGrpSpPr/>
-        <p:nvPr/>
-      </p:nvGrpSpPr>
-      <p:grpSpPr>
-        <a:xfrm>
-          <a:off x="0" y="0"/>
-          <a:ext cx="0" cy="0"/>
-          <a:chOff x="0" y="0"/>
-          <a:chExt cx="0" cy="0"/>
-        </a:xfrm>
-      </p:grpSpPr>
-      <p:sp>
-        <p:nvSpPr>
-          <p:cNvPr id="2" name="Título 1"/>
-          <p:cNvSpPr>
-            <a:spLocks noGrp="1"/>
-          </p:cNvSpPr>
-          <p:nvPr>
-            <p:ph type="title"/>
-          </p:nvPr>
-        </p:nvSpPr>
-        <p:spPr/>
-        <p:txBody>
-          <a:bodyPr/>
-          <a:lstStyle/>
-          <a:p>
-            <a:r>
-              <a:rPr lang="es-ES_tradnl" dirty="0" err="1" smtClean="0"/>
-              <a:t>Example</a:t>
-            </a:r>
-            <a:r>
-              <a:rPr lang="es-ES_tradnl" dirty="0" smtClean="0"/>
-              <a:t> 1</a:t>
-            </a:r>
-            <a:endParaRPr lang="es-ES_tradnl" dirty="0"/>
-          </a:p>
-        </p:txBody>
-      </p:sp>
-      <p:pic>
-        <p:nvPicPr>
-          <p:cNvPr id="4" name="Imagen 3"/>
-          <p:cNvPicPr>
-            <a:picLocks noChangeAspect="1"/>
-          </p:cNvPicPr>
-          <p:nvPr/>
-        </p:nvPicPr>
-        <p:blipFill>
-          <a:blip r:embed="rId3">
-            <a:extLst>
-              <a:ext uri="{28A0092B-C50C-407E-A947-70E740481C1C}">
-                <a14:useLocalDpi xmlns:a14="http://schemas.microsoft.com/office/drawing/2010/main" val="0"/>
-              </a:ext>
-            </a:extLst>
-          </a:blip>
-          <a:stretch>
-            <a:fillRect/>
-          </a:stretch>
-        </p:blipFill>
-        <p:spPr>
-          <a:xfrm>
-            <a:off x="914400" y="1767841"/>
-            <a:ext cx="10789920" cy="3893790"/>
-          </a:xfrm>
-          <a:prstGeom prst="rect">
-            <a:avLst/>
-          </a:prstGeom>
-        </p:spPr>
-      </p:pic>
-    </p:spTree>
-    <p:extLst>
-      <p:ext uri="{BB962C8B-B14F-4D97-AF65-F5344CB8AC3E}">
-        <p14:creationId xmlns:p14="http://schemas.microsoft.com/office/powerpoint/2010/main" val="1707600574"/>
-      </p:ext>
-    </p:extLst>
-  </p:cSld>
-  <p:clrMapOvr>
-    <a:masterClrMapping/>
-  </p:clrMapOvr>
-</p:sld>
-</file>
-
-<file path=ppt/slides/slide12.xml><?xml version="1.0" encoding="utf-8"?>
-<p:sld xmlns:a="http://schemas.openxmlformats.org/drawingml/2006/main" xmlns:r="http://schemas.openxmlformats.org/officeDocument/2006/relationships" xmlns:p="http://schemas.openxmlformats.org/presentationml/2006/main">
-  <p:cSld>
-    <p:spTree>
-      <p:nvGrpSpPr>
-        <p:cNvPr id="1" name=""/>
-        <p:cNvGrpSpPr/>
-        <p:nvPr/>
-      </p:nvGrpSpPr>
-      <p:grpSpPr>
-        <a:xfrm>
-          <a:off x="0" y="0"/>
-          <a:ext cx="0" cy="0"/>
-          <a:chOff x="0" y="0"/>
-          <a:chExt cx="0" cy="0"/>
-        </a:xfrm>
-      </p:grpSpPr>
-      <p:sp>
-        <p:nvSpPr>
-          <p:cNvPr id="2" name="Título 1"/>
-          <p:cNvSpPr>
-            <a:spLocks noGrp="1"/>
-          </p:cNvSpPr>
-          <p:nvPr>
-            <p:ph type="title"/>
-          </p:nvPr>
-        </p:nvSpPr>
-        <p:spPr/>
-        <p:txBody>
-          <a:bodyPr/>
-          <a:lstStyle/>
-          <a:p>
-            <a:r>
-              <a:rPr lang="es-ES_tradnl" dirty="0" err="1" smtClean="0"/>
-              <a:t>Example</a:t>
-            </a:r>
-            <a:r>
-              <a:rPr lang="es-ES_tradnl" dirty="0" smtClean="0"/>
-              <a:t> 2</a:t>
-            </a:r>
-            <a:endParaRPr lang="es-ES_tradnl" dirty="0"/>
-          </a:p>
-        </p:txBody>
-      </p:sp>
-      <p:pic>
-        <p:nvPicPr>
-          <p:cNvPr id="6" name="Imagen 5"/>
-          <p:cNvPicPr>
-            <a:picLocks noChangeAspect="1"/>
-          </p:cNvPicPr>
-          <p:nvPr/>
-        </p:nvPicPr>
-        <p:blipFill>
-          <a:blip r:embed="rId2">
-            <a:extLst>
-              <a:ext uri="{28A0092B-C50C-407E-A947-70E740481C1C}">
-                <a14:useLocalDpi xmlns:a14="http://schemas.microsoft.com/office/drawing/2010/main" val="0"/>
-              </a:ext>
-            </a:extLst>
-          </a:blip>
-          <a:stretch>
-            <a:fillRect/>
-          </a:stretch>
-        </p:blipFill>
-        <p:spPr>
-          <a:xfrm>
-            <a:off x="338328" y="1788669"/>
-            <a:ext cx="10789920" cy="4865418"/>
-          </a:xfrm>
-          <a:prstGeom prst="rect">
-            <a:avLst/>
-          </a:prstGeom>
-        </p:spPr>
-      </p:pic>
-    </p:spTree>
-    <p:extLst>
-      <p:ext uri="{BB962C8B-B14F-4D97-AF65-F5344CB8AC3E}">
-        <p14:creationId xmlns:p14="http://schemas.microsoft.com/office/powerpoint/2010/main" val="671388710"/>
-      </p:ext>
-    </p:extLst>
-  </p:cSld>
-  <p:clrMapOvr>
-    <a:masterClrMapping/>
-  </p:clrMapOvr>
-</p:sld>
-</file>
-
 <file path=ppt/slides/slide13.xml><?xml version="1.0" encoding="utf-8"?>
 <p:sld xmlns:a="http://schemas.openxmlformats.org/drawingml/2006/main" xmlns:r="http://schemas.openxmlformats.org/officeDocument/2006/relationships" xmlns:p="http://schemas.openxmlformats.org/presentationml/2006/main">
   <p:cSld>
@@ -9779,6 +9790,13 @@
   <p:clrMapOvr>
     <a:masterClrMapping/>
   </p:clrMapOvr>
+  <p:timing>
+    <p:tnLst>
+      <p:par>
+        <p:cTn id="1" dur="indefinite" restart="never" nodeType="tmRoot"/>
+      </p:par>
+    </p:tnLst>
+  </p:timing>
 </p:sld>
 </file>
 
@@ -10037,11 +10055,7 @@
             </a:r>
             <a:r>
               <a:rPr lang="en-US" dirty="0" smtClean="0"/>
-              <a:t>GDETL for </a:t>
-            </a:r>
-            <a:r>
-              <a:rPr lang="en-US" dirty="0" smtClean="0"/>
-              <a:t>Spanish (Javier Osorio Label Data)</a:t>
+              <a:t>GDETL for Spanish (Javier Osorio Label Data)</a:t>
             </a:r>
             <a:endParaRPr lang="en-US" b="1" dirty="0" smtClean="0"/>
           </a:p>
@@ -10382,11 +10396,7 @@
           <a:p>
             <a:r>
               <a:rPr lang="es-ES_tradnl" dirty="0" smtClean="0"/>
-              <a:t>UNIT OF </a:t>
-            </a:r>
-            <a:r>
-              <a:rPr lang="es-ES_tradnl" dirty="0" smtClean="0"/>
-              <a:t>PREDICTION</a:t>
+              <a:t>UNIT OF PREDICTION</a:t>
             </a:r>
           </a:p>
           <a:p>
@@ -10404,15 +10414,7 @@
           <a:p>
             <a:r>
               <a:rPr lang="es-ES_tradnl" dirty="0" smtClean="0"/>
-              <a:t>NUMBER </a:t>
-            </a:r>
-            <a:r>
-              <a:rPr lang="es-ES_tradnl" dirty="0" smtClean="0"/>
-              <a:t>OF CLASSES VALUES </a:t>
-            </a:r>
-            <a:r>
-              <a:rPr lang="es-ES_tradnl" dirty="0" smtClean="0"/>
-              <a:t>FOR EACH DOC</a:t>
+              <a:t>NUMBER OF CLASSES VALUES FOR EACH DOC</a:t>
             </a:r>
           </a:p>
           <a:p>
@@ -10728,7 +10730,7 @@
           </a:p>
           <a:p>
             <a:r>
-              <a:rPr lang="en-US" b="1" dirty="0" smtClean="0"/>
+              <a:rPr lang="en-US" dirty="0" smtClean="0"/>
               <a:t>SPLITTING</a:t>
             </a:r>
           </a:p>
@@ -10776,70 +10778,6 @@
           </a:prstGeom>
         </p:spPr>
       </p:pic>
-      <p:pic>
-        <p:nvPicPr>
-          <p:cNvPr id="6" name="Imagen 5"/>
-          <p:cNvPicPr>
-            <a:picLocks noChangeAspect="1"/>
-          </p:cNvPicPr>
-          <p:nvPr/>
-        </p:nvPicPr>
-        <p:blipFill>
-          <a:blip r:embed="rId4">
-            <a:extLst>
-              <a:ext uri="{28A0092B-C50C-407E-A947-70E740481C1C}">
-                <a14:useLocalDpi xmlns:a14="http://schemas.microsoft.com/office/drawing/2010/main" val="0"/>
-              </a:ext>
-            </a:extLst>
-          </a:blip>
-          <a:stretch>
-            <a:fillRect/>
-          </a:stretch>
-        </p:blipFill>
-        <p:spPr>
-          <a:xfrm>
-            <a:off x="1993363" y="4535833"/>
-            <a:ext cx="8597900" cy="1930400"/>
-          </a:xfrm>
-          <a:prstGeom prst="rect">
-            <a:avLst/>
-          </a:prstGeom>
-        </p:spPr>
-      </p:pic>
-      <p:sp>
-        <p:nvSpPr>
-          <p:cNvPr id="5" name="CuadroTexto 4"/>
-          <p:cNvSpPr txBox="1"/>
-          <p:nvPr/>
-        </p:nvSpPr>
-        <p:spPr>
-          <a:xfrm>
-            <a:off x="8144821" y="6208808"/>
-            <a:ext cx="3781587" cy="369332"/>
-          </a:xfrm>
-          <a:prstGeom prst="rect">
-            <a:avLst/>
-          </a:prstGeom>
-          <a:noFill/>
-        </p:spPr>
-        <p:txBody>
-          <a:bodyPr wrap="square" rtlCol="0">
-            <a:spAutoFit/>
-          </a:bodyPr>
-          <a:lstStyle/>
-          <a:p>
-            <a:r>
-              <a:rPr lang="es-ES_tradnl" dirty="0" smtClean="0"/>
-              <a:t>Source: </a:t>
-            </a:r>
-            <a:r>
-              <a:rPr lang="es-ES_tradnl" dirty="0" err="1" smtClean="0"/>
-              <a:t>SpaCy</a:t>
-            </a:r>
-            <a:endParaRPr lang="es-ES_tradnl" dirty="0"/>
-          </a:p>
-        </p:txBody>
-      </p:sp>
       <p:sp>
         <p:nvSpPr>
           <p:cNvPr id="7" name="Rectángulo 6"/>
@@ -10944,6 +10882,70 @@
             <a:r>
               <a:rPr lang="es-ES_tradnl" dirty="0" smtClean="0"/>
               <a:t>: NLTK</a:t>
+            </a:r>
+            <a:endParaRPr lang="es-ES_tradnl" dirty="0"/>
+          </a:p>
+        </p:txBody>
+      </p:sp>
+      <p:pic>
+        <p:nvPicPr>
+          <p:cNvPr id="10" name="Imagen 9"/>
+          <p:cNvPicPr>
+            <a:picLocks noChangeAspect="1"/>
+          </p:cNvPicPr>
+          <p:nvPr/>
+        </p:nvPicPr>
+        <p:blipFill>
+          <a:blip r:embed="rId4">
+            <a:extLst>
+              <a:ext uri="{28A0092B-C50C-407E-A947-70E740481C1C}">
+                <a14:useLocalDpi xmlns:a14="http://schemas.microsoft.com/office/drawing/2010/main" val="0"/>
+              </a:ext>
+            </a:extLst>
+          </a:blip>
+          <a:stretch>
+            <a:fillRect/>
+          </a:stretch>
+        </p:blipFill>
+        <p:spPr>
+          <a:xfrm>
+            <a:off x="2881210" y="4789890"/>
+            <a:ext cx="7988731" cy="1779201"/>
+          </a:xfrm>
+          <a:prstGeom prst="rect">
+            <a:avLst/>
+          </a:prstGeom>
+        </p:spPr>
+      </p:pic>
+      <p:sp>
+        <p:nvSpPr>
+          <p:cNvPr id="5" name="CuadroTexto 4"/>
+          <p:cNvSpPr txBox="1"/>
+          <p:nvPr/>
+        </p:nvSpPr>
+        <p:spPr>
+          <a:xfrm>
+            <a:off x="7088353" y="6442249"/>
+            <a:ext cx="3781587" cy="369332"/>
+          </a:xfrm>
+          <a:prstGeom prst="rect">
+            <a:avLst/>
+          </a:prstGeom>
+          <a:noFill/>
+        </p:spPr>
+        <p:txBody>
+          <a:bodyPr wrap="square" rtlCol="0">
+            <a:spAutoFit/>
+          </a:bodyPr>
+          <a:lstStyle/>
+          <a:p>
+            <a:r>
+              <a:rPr lang="es-ES_tradnl" dirty="0" smtClean="0"/>
+              <a:t>Source: </a:t>
+            </a:r>
+            <a:r>
+              <a:rPr lang="es-ES_tradnl" dirty="0" err="1" smtClean="0"/>
+              <a:t>SpaCy</a:t>
             </a:r>
             <a:endParaRPr lang="es-ES_tradnl" dirty="0"/>
           </a:p>
@@ -11008,7 +11010,7 @@
           </a:p>
           <a:p>
             <a:r>
-              <a:rPr lang="en-US" dirty="0"/>
+              <a:rPr lang="en-US" b="1" dirty="0"/>
               <a:t>SPLITTING</a:t>
             </a:r>
           </a:p>
@@ -11102,36 +11104,6 @@
           </a:p>
         </p:txBody>
       </p:sp>
-      <p:pic>
-        <p:nvPicPr>
-          <p:cNvPr id="5" name="Imagen 4"/>
-          <p:cNvPicPr>
-            <a:picLocks noChangeAspect="1"/>
-          </p:cNvPicPr>
-          <p:nvPr/>
-        </p:nvPicPr>
-        <p:blipFill>
-          <a:blip r:embed="rId4">
-            <a:extLst>
-              <a:ext uri="{28A0092B-C50C-407E-A947-70E740481C1C}">
-                <a14:useLocalDpi xmlns:a14="http://schemas.microsoft.com/office/drawing/2010/main" val="0"/>
-              </a:ext>
-            </a:extLst>
-          </a:blip>
-          <a:stretch>
-            <a:fillRect/>
-          </a:stretch>
-        </p:blipFill>
-        <p:spPr>
-          <a:xfrm>
-            <a:off x="4203269" y="1347436"/>
-            <a:ext cx="7988731" cy="1779201"/>
-          </a:xfrm>
-          <a:prstGeom prst="rect">
-            <a:avLst/>
-          </a:prstGeom>
-        </p:spPr>
-      </p:pic>
       <p:sp>
         <p:nvSpPr>
           <p:cNvPr id="7" name="CuadroTexto 6"/>
@@ -11174,7 +11146,7 @@
         </p:nvSpPr>
         <p:spPr>
           <a:xfrm>
-            <a:off x="4203269" y="3126569"/>
+            <a:off x="5795229" y="3571856"/>
             <a:ext cx="5980176" cy="646331"/>
           </a:xfrm>
           <a:prstGeom prst="rect">
@@ -11205,7 +11177,7 @@
           <p:nvPr/>
         </p:nvPicPr>
         <p:blipFill>
-          <a:blip r:embed="rId5">
+          <a:blip r:embed="rId4">
             <a:extLst>
               <a:ext uri="{28A0092B-C50C-407E-A947-70E740481C1C}">
                 <a14:useLocalDpi xmlns:a14="http://schemas.microsoft.com/office/drawing/2010/main" val="0"/>
@@ -11264,7 +11236,7 @@
         </p:nvSpPr>
         <p:spPr>
           <a:xfrm>
-            <a:off x="4203269" y="4033521"/>
+            <a:off x="4203268" y="4165417"/>
             <a:ext cx="5702885" cy="369332"/>
           </a:xfrm>
           <a:prstGeom prst="rect">
@@ -11286,6 +11258,36 @@
           </a:p>
         </p:txBody>
       </p:sp>
+      <p:pic>
+        <p:nvPicPr>
+          <p:cNvPr id="13" name="Imagen 12"/>
+          <p:cNvPicPr>
+            <a:picLocks noChangeAspect="1"/>
+          </p:cNvPicPr>
+          <p:nvPr/>
+        </p:nvPicPr>
+        <p:blipFill>
+          <a:blip r:embed="rId5">
+            <a:extLst>
+              <a:ext uri="{28A0092B-C50C-407E-A947-70E740481C1C}">
+                <a14:useLocalDpi xmlns:a14="http://schemas.microsoft.com/office/drawing/2010/main" val="0"/>
+              </a:ext>
+            </a:extLst>
+          </a:blip>
+          <a:stretch>
+            <a:fillRect/>
+          </a:stretch>
+        </p:blipFill>
+        <p:spPr>
+          <a:xfrm>
+            <a:off x="3594100" y="1527642"/>
+            <a:ext cx="8597900" cy="1930400"/>
+          </a:xfrm>
+          <a:prstGeom prst="rect">
+            <a:avLst/>
+          </a:prstGeom>
+        </p:spPr>
+      </p:pic>
       <p:sp>
         <p:nvSpPr>
           <p:cNvPr id="12" name="CuadroTexto 11"/>
@@ -11326,6 +11328,13 @@
   <p:clrMapOvr>
     <a:masterClrMapping/>
   </p:clrMapOvr>
+  <p:timing>
+    <p:tnLst>
+      <p:par>
+        <p:cTn id="1" dur="indefinite" restart="never" nodeType="tmRoot"/>
+      </p:par>
+    </p:tnLst>
+  </p:timing>
 </p:sld>
 </file>
 
@@ -11550,7 +11559,6 @@
               <a:rPr lang="es-ES_tradnl" dirty="0"/>
               <a:t> </a:t>
             </a:r>
-            <a:endParaRPr lang="es-ES_tradnl" dirty="0"/>
           </a:p>
         </p:txBody>
       </p:sp>
@@ -11564,6 +11572,13 @@
   <p:clrMapOvr>
     <a:masterClrMapping/>
   </p:clrMapOvr>
+  <p:timing>
+    <p:tnLst>
+      <p:par>
+        <p:cTn id="1" dur="indefinite" restart="never" nodeType="tmRoot"/>
+      </p:par>
+    </p:tnLst>
+  </p:timing>
 </p:sld>
 </file>
 

</xml_diff>